<commit_message>
update to version 1.1
</commit_message>
<xml_diff>
--- a/Presentazione/SCENA 3D INSEGUIMENTO NELLO SPAZIO.pptx
+++ b/Presentazione/SCENA 3D INSEGUIMENTO NELLO SPAZIO.pptx
@@ -7995,13 +7995,12 @@
           <p:cNvPicPr preferRelativeResize="0"/>
           <p:nvPr/>
         </p:nvPicPr>
-        <p:blipFill>
+        <p:blipFill rotWithShape="1">
           <a:blip r:embed="rId3">
             <a:alphaModFix/>
           </a:blip>
-          <a:stretch>
-            <a:fillRect/>
-          </a:stretch>
+          <a:srcRect b="0" l="0" r="0" t="0"/>
+          <a:stretch/>
         </p:blipFill>
         <p:spPr>
           <a:xfrm>
@@ -8295,13 +8294,12 @@
           <p:cNvPicPr preferRelativeResize="0"/>
           <p:nvPr/>
         </p:nvPicPr>
-        <p:blipFill>
+        <p:blipFill rotWithShape="1">
           <a:blip r:embed="rId3">
             <a:alphaModFix/>
           </a:blip>
-          <a:stretch>
-            <a:fillRect/>
-          </a:stretch>
+          <a:srcRect b="0" l="0" r="0" t="0"/>
+          <a:stretch/>
         </p:blipFill>
         <p:spPr>
           <a:xfrm>
@@ -8564,13 +8562,12 @@
           <p:cNvPicPr preferRelativeResize="0"/>
           <p:nvPr/>
         </p:nvPicPr>
-        <p:blipFill>
+        <p:blipFill rotWithShape="1">
           <a:blip r:embed="rId3">
             <a:alphaModFix/>
           </a:blip>
-          <a:stretch>
-            <a:fillRect/>
-          </a:stretch>
+          <a:srcRect b="0" l="0" r="0" t="0"/>
+          <a:stretch/>
         </p:blipFill>
         <p:spPr>
           <a:xfrm>
@@ -8696,18 +8693,17 @@
           <p:cNvPicPr preferRelativeResize="0"/>
           <p:nvPr/>
         </p:nvPicPr>
-        <p:blipFill>
+        <p:blipFill rotWithShape="1">
           <a:blip r:embed="rId3">
             <a:alphaModFix/>
           </a:blip>
-          <a:stretch>
-            <a:fillRect/>
-          </a:stretch>
+          <a:srcRect b="0" l="485" r="485" t="0"/>
+          <a:stretch/>
         </p:blipFill>
         <p:spPr>
           <a:xfrm>
             <a:off x="2862998" y="0"/>
-            <a:ext cx="6281006" cy="5143501"/>
+            <a:ext cx="6281005" cy="5143501"/>
           </a:xfrm>
           <a:prstGeom prst="rect">
             <a:avLst/>

</xml_diff>